<commit_message>
Restructured the repo and removed personal info
</commit_message>
<xml_diff>
--- a/Wirlessnetworks-and-Vulnerabililties.pptx
+++ b/Wirlessnetworks-and-Vulnerabililties.pptx
@@ -7677,7 +7677,11 @@
         </p:nvPicPr>
         <p:blipFill>
           <a:blip r:embed="rId3">
-            <a:alphaModFix/>
+            <a:extLst>
+              <a:ext uri="{28A0092B-C50C-407E-A947-70E740481C1C}">
+                <a14:useLocalDpi xmlns:a14="http://schemas.microsoft.com/office/drawing/2010/main" val="0"/>
+              </a:ext>
+            </a:extLst>
           </a:blip>
           <a:stretch>
             <a:fillRect/>
@@ -7685,8 +7689,8 @@
         </p:blipFill>
         <p:spPr>
           <a:xfrm>
-            <a:off x="1776774" y="1322075"/>
-            <a:ext cx="5517399" cy="3701225"/>
+            <a:off x="1776774" y="1323497"/>
+            <a:ext cx="5517399" cy="3698381"/>
           </a:xfrm>
           <a:prstGeom prst="rect">
             <a:avLst/>
@@ -7801,7 +7805,11 @@
         </p:nvPicPr>
         <p:blipFill>
           <a:blip r:embed="rId3">
-            <a:alphaModFix/>
+            <a:extLst>
+              <a:ext uri="{28A0092B-C50C-407E-A947-70E740481C1C}">
+                <a14:useLocalDpi xmlns:a14="http://schemas.microsoft.com/office/drawing/2010/main" val="0"/>
+              </a:ext>
+            </a:extLst>
           </a:blip>
           <a:stretch>
             <a:fillRect/>
@@ -7809,8 +7817,8 @@
         </p:blipFill>
         <p:spPr>
           <a:xfrm>
-            <a:off x="1844988" y="1302325"/>
-            <a:ext cx="5448526" cy="3680550"/>
+            <a:off x="1844988" y="1303828"/>
+            <a:ext cx="5448526" cy="3677543"/>
           </a:xfrm>
           <a:prstGeom prst="rect">
             <a:avLst/>

</xml_diff>